<commit_message>
Enhance chat message display: implement typewriter effect for bot messages and improve styling for user and bot message bubbles
</commit_message>
<xml_diff>
--- a/docs/App Struktur.pptx
+++ b/docs/App Struktur.pptx
@@ -104,6 +104,11 @@
       </a:defRPr>
     </a:lvl9pPr>
   </p:defaultTextStyle>
+  <p:extLst>
+    <p:ext uri="{EFAFB233-063F-42B5-8137-9DF3F51BA10A}">
+      <p15:sldGuideLst xmlns:p15="http://schemas.microsoft.com/office/powerpoint/2012/main"/>
+    </p:ext>
+  </p:extLst>
 </p:presentation>
 </file>
 
@@ -256,7 +261,7 @@
           <a:p>
             <a:fld id="{56BEFA05-E13E-4389-BA5A-242179F3C1A0}" type="datetimeFigureOut">
               <a:rPr lang="de-DE" smtClean="0"/>
-              <a:t>10.03.2025</a:t>
+              <a:t>20.03.2025</a:t>
             </a:fld>
             <a:endParaRPr lang="de-DE"/>
           </a:p>
@@ -456,7 +461,7 @@
           <a:p>
             <a:fld id="{56BEFA05-E13E-4389-BA5A-242179F3C1A0}" type="datetimeFigureOut">
               <a:rPr lang="de-DE" smtClean="0"/>
-              <a:t>10.03.2025</a:t>
+              <a:t>20.03.2025</a:t>
             </a:fld>
             <a:endParaRPr lang="de-DE"/>
           </a:p>
@@ -666,7 +671,7 @@
           <a:p>
             <a:fld id="{56BEFA05-E13E-4389-BA5A-242179F3C1A0}" type="datetimeFigureOut">
               <a:rPr lang="de-DE" smtClean="0"/>
-              <a:t>10.03.2025</a:t>
+              <a:t>20.03.2025</a:t>
             </a:fld>
             <a:endParaRPr lang="de-DE"/>
           </a:p>
@@ -866,7 +871,7 @@
           <a:p>
             <a:fld id="{56BEFA05-E13E-4389-BA5A-242179F3C1A0}" type="datetimeFigureOut">
               <a:rPr lang="de-DE" smtClean="0"/>
-              <a:t>10.03.2025</a:t>
+              <a:t>20.03.2025</a:t>
             </a:fld>
             <a:endParaRPr lang="de-DE"/>
           </a:p>
@@ -1142,7 +1147,7 @@
           <a:p>
             <a:fld id="{56BEFA05-E13E-4389-BA5A-242179F3C1A0}" type="datetimeFigureOut">
               <a:rPr lang="de-DE" smtClean="0"/>
-              <a:t>10.03.2025</a:t>
+              <a:t>20.03.2025</a:t>
             </a:fld>
             <a:endParaRPr lang="de-DE"/>
           </a:p>
@@ -1410,7 +1415,7 @@
           <a:p>
             <a:fld id="{56BEFA05-E13E-4389-BA5A-242179F3C1A0}" type="datetimeFigureOut">
               <a:rPr lang="de-DE" smtClean="0"/>
-              <a:t>10.03.2025</a:t>
+              <a:t>20.03.2025</a:t>
             </a:fld>
             <a:endParaRPr lang="de-DE"/>
           </a:p>
@@ -1825,7 +1830,7 @@
           <a:p>
             <a:fld id="{56BEFA05-E13E-4389-BA5A-242179F3C1A0}" type="datetimeFigureOut">
               <a:rPr lang="de-DE" smtClean="0"/>
-              <a:t>10.03.2025</a:t>
+              <a:t>20.03.2025</a:t>
             </a:fld>
             <a:endParaRPr lang="de-DE"/>
           </a:p>
@@ -1967,7 +1972,7 @@
           <a:p>
             <a:fld id="{56BEFA05-E13E-4389-BA5A-242179F3C1A0}" type="datetimeFigureOut">
               <a:rPr lang="de-DE" smtClean="0"/>
-              <a:t>10.03.2025</a:t>
+              <a:t>20.03.2025</a:t>
             </a:fld>
             <a:endParaRPr lang="de-DE"/>
           </a:p>
@@ -2080,7 +2085,7 @@
           <a:p>
             <a:fld id="{56BEFA05-E13E-4389-BA5A-242179F3C1A0}" type="datetimeFigureOut">
               <a:rPr lang="de-DE" smtClean="0"/>
-              <a:t>10.03.2025</a:t>
+              <a:t>20.03.2025</a:t>
             </a:fld>
             <a:endParaRPr lang="de-DE"/>
           </a:p>
@@ -2393,7 +2398,7 @@
           <a:p>
             <a:fld id="{56BEFA05-E13E-4389-BA5A-242179F3C1A0}" type="datetimeFigureOut">
               <a:rPr lang="de-DE" smtClean="0"/>
-              <a:t>10.03.2025</a:t>
+              <a:t>20.03.2025</a:t>
             </a:fld>
             <a:endParaRPr lang="de-DE"/>
           </a:p>
@@ -2682,7 +2687,7 @@
           <a:p>
             <a:fld id="{56BEFA05-E13E-4389-BA5A-242179F3C1A0}" type="datetimeFigureOut">
               <a:rPr lang="de-DE" smtClean="0"/>
-              <a:t>10.03.2025</a:t>
+              <a:t>20.03.2025</a:t>
             </a:fld>
             <a:endParaRPr lang="de-DE"/>
           </a:p>
@@ -2925,7 +2930,7 @@
           <a:p>
             <a:fld id="{56BEFA05-E13E-4389-BA5A-242179F3C1A0}" type="datetimeFigureOut">
               <a:rPr lang="de-DE" smtClean="0"/>
-              <a:t>10.03.2025</a:t>
+              <a:t>20.03.2025</a:t>
             </a:fld>
             <a:endParaRPr lang="de-DE"/>
           </a:p>
@@ -3356,8 +3361,8 @@
         </p:nvSpPr>
         <p:spPr>
           <a:xfrm>
-            <a:off x="0" y="0"/>
-            <a:ext cx="12192000" cy="6858000"/>
+            <a:off x="3200400" y="795528"/>
+            <a:ext cx="4596384" cy="4773168"/>
           </a:xfrm>
           <a:prstGeom prst="rect">
             <a:avLst/>
@@ -3593,104 +3598,6 @@
             <a:r>
               <a:rPr lang="de-DE" dirty="0" err="1"/>
               <a:t>menu</a:t>
-            </a:r>
-            <a:endParaRPr lang="de-DE" dirty="0"/>
-          </a:p>
-        </p:txBody>
-      </p:sp>
-      <p:sp>
-        <p:nvSpPr>
-          <p:cNvPr id="8" name="Rectangle: Single Corner Snipped 7">
-            <a:extLst>
-              <a:ext uri="{FF2B5EF4-FFF2-40B4-BE49-F238E27FC236}">
-                <a16:creationId xmlns:a16="http://schemas.microsoft.com/office/drawing/2014/main" id="{AE02A5FD-34E7-845C-17CE-4466A04DFEC8}"/>
-              </a:ext>
-            </a:extLst>
-          </p:cNvPr>
-          <p:cNvSpPr/>
-          <p:nvPr/>
-        </p:nvSpPr>
-        <p:spPr>
-          <a:xfrm>
-            <a:off x="6096000" y="3849624"/>
-            <a:ext cx="1700784" cy="571500"/>
-          </a:xfrm>
-          <a:prstGeom prst="snip1Rect">
-            <a:avLst/>
-          </a:prstGeom>
-        </p:spPr>
-        <p:style>
-          <a:lnRef idx="2">
-            <a:schemeClr val="accent1">
-              <a:shade val="15000"/>
-            </a:schemeClr>
-          </a:lnRef>
-          <a:fillRef idx="1">
-            <a:schemeClr val="accent1"/>
-          </a:fillRef>
-          <a:effectRef idx="0">
-            <a:schemeClr val="accent1"/>
-          </a:effectRef>
-          <a:fontRef idx="minor">
-            <a:schemeClr val="lt1"/>
-          </a:fontRef>
-        </p:style>
-        <p:txBody>
-          <a:bodyPr rtlCol="0" anchor="ctr"/>
-          <a:lstStyle/>
-          <a:p>
-            <a:r>
-              <a:rPr lang="de-DE" dirty="0" err="1"/>
-              <a:t>message</a:t>
-            </a:r>
-            <a:endParaRPr lang="de-DE" dirty="0"/>
-          </a:p>
-        </p:txBody>
-      </p:sp>
-      <p:sp>
-        <p:nvSpPr>
-          <p:cNvPr id="11" name="Rectangle: Single Corner Snipped 10">
-            <a:extLst>
-              <a:ext uri="{FF2B5EF4-FFF2-40B4-BE49-F238E27FC236}">
-                <a16:creationId xmlns:a16="http://schemas.microsoft.com/office/drawing/2014/main" id="{984B65B2-61E4-F17A-766E-8A69990DB6DD}"/>
-              </a:ext>
-            </a:extLst>
-          </p:cNvPr>
-          <p:cNvSpPr/>
-          <p:nvPr/>
-        </p:nvSpPr>
-        <p:spPr>
-          <a:xfrm>
-            <a:off x="4395216" y="2036826"/>
-            <a:ext cx="1700784" cy="571500"/>
-          </a:xfrm>
-          <a:prstGeom prst="snip1Rect">
-            <a:avLst/>
-          </a:prstGeom>
-        </p:spPr>
-        <p:style>
-          <a:lnRef idx="2">
-            <a:schemeClr val="accent1">
-              <a:shade val="15000"/>
-            </a:schemeClr>
-          </a:lnRef>
-          <a:fillRef idx="1">
-            <a:schemeClr val="accent1"/>
-          </a:fillRef>
-          <a:effectRef idx="0">
-            <a:schemeClr val="accent1"/>
-          </a:effectRef>
-          <a:fontRef idx="minor">
-            <a:schemeClr val="lt1"/>
-          </a:fontRef>
-        </p:style>
-        <p:txBody>
-          <a:bodyPr rtlCol="0" anchor="ctr"/>
-          <a:lstStyle/>
-          <a:p>
-            <a:r>
-              <a:rPr lang="de-DE" dirty="0" err="1"/>
-              <a:t>message</a:t>
             </a:r>
             <a:endParaRPr lang="de-DE" dirty="0"/>
           </a:p>

</xml_diff>